<commit_message>
Add Multilayers pptx files
Add Multilayers pptx files
</commit_message>
<xml_diff>
--- a/doc/neural_network_for_multilayers01.pptx
+++ b/doc/neural_network_for_multilayers01.pptx
@@ -3783,8 +3783,8 @@
           </a:p>
         </p:txBody>
       </p:sp>
-      <mc:AlternateContent xmlns:mc="http://schemas.openxmlformats.org/markup-compatibility/2006">
-        <mc:Choice xmlns:a14="http://schemas.microsoft.com/office/drawing/2010/main" Requires="a14">
+      <mc:AlternateContent xmlns:mc="http://schemas.openxmlformats.org/markup-compatibility/2006" xmlns:a14="http://schemas.microsoft.com/office/drawing/2010/main">
+        <mc:Choice Requires="a14">
           <p:sp>
             <p:nvSpPr>
               <p:cNvPr id="67" name="TextBox 66"/>
@@ -3858,7 +3858,7 @@
             </p:txBody>
           </p:sp>
         </mc:Choice>
-        <mc:Fallback>
+        <mc:Fallback xmlns="">
           <p:sp>
             <p:nvSpPr>
               <p:cNvPr id="67" name="TextBox 66"/>
@@ -6176,8 +6176,8 @@
           </a:fontRef>
         </p:style>
       </p:cxnSp>
-      <mc:AlternateContent xmlns:mc="http://schemas.openxmlformats.org/markup-compatibility/2006">
-        <mc:Choice xmlns:a14="http://schemas.microsoft.com/office/drawing/2010/main" Requires="a14">
+      <mc:AlternateContent xmlns:mc="http://schemas.openxmlformats.org/markup-compatibility/2006" xmlns:a14="http://schemas.microsoft.com/office/drawing/2010/main">
+        <mc:Choice Requires="a14">
           <p:sp>
             <p:nvSpPr>
               <p:cNvPr id="189" name="TextBox 188"/>
@@ -6251,7 +6251,7 @@
             </p:txBody>
           </p:sp>
         </mc:Choice>
-        <mc:Fallback>
+        <mc:Fallback xmlns="">
           <p:sp>
             <p:nvSpPr>
               <p:cNvPr id="189" name="TextBox 188"/>
@@ -6290,8 +6290,8 @@
           </p:sp>
         </mc:Fallback>
       </mc:AlternateContent>
-      <mc:AlternateContent xmlns:mc="http://schemas.openxmlformats.org/markup-compatibility/2006">
-        <mc:Choice xmlns:a14="http://schemas.microsoft.com/office/drawing/2010/main" Requires="a14">
+      <mc:AlternateContent xmlns:mc="http://schemas.openxmlformats.org/markup-compatibility/2006" xmlns:a14="http://schemas.microsoft.com/office/drawing/2010/main">
+        <mc:Choice Requires="a14">
           <p:sp>
             <p:nvSpPr>
               <p:cNvPr id="190" name="TextBox 189"/>
@@ -6365,7 +6365,7 @@
             </p:txBody>
           </p:sp>
         </mc:Choice>
-        <mc:Fallback>
+        <mc:Fallback xmlns="">
           <p:sp>
             <p:nvSpPr>
               <p:cNvPr id="190" name="TextBox 189"/>
@@ -6404,8 +6404,8 @@
           </p:sp>
         </mc:Fallback>
       </mc:AlternateContent>
-      <mc:AlternateContent xmlns:mc="http://schemas.openxmlformats.org/markup-compatibility/2006">
-        <mc:Choice xmlns:a14="http://schemas.microsoft.com/office/drawing/2010/main" Requires="a14">
+      <mc:AlternateContent xmlns:mc="http://schemas.openxmlformats.org/markup-compatibility/2006" xmlns:a14="http://schemas.microsoft.com/office/drawing/2010/main">
+        <mc:Choice Requires="a14">
           <p:sp>
             <p:nvSpPr>
               <p:cNvPr id="191" name="TextBox 190"/>
@@ -6479,7 +6479,7 @@
             </p:txBody>
           </p:sp>
         </mc:Choice>
-        <mc:Fallback>
+        <mc:Fallback xmlns="">
           <p:sp>
             <p:nvSpPr>
               <p:cNvPr id="191" name="TextBox 190"/>
@@ -7197,8 +7197,8 @@
           </p:sp>
         </mc:Fallback>
       </mc:AlternateContent>
-      <mc:AlternateContent xmlns:mc="http://schemas.openxmlformats.org/markup-compatibility/2006" xmlns:a14="http://schemas.microsoft.com/office/drawing/2010/main">
-        <mc:Choice Requires="a14">
+      <mc:AlternateContent xmlns:mc="http://schemas.openxmlformats.org/markup-compatibility/2006">
+        <mc:Choice xmlns:a14="http://schemas.microsoft.com/office/drawing/2010/main" Requires="a14">
           <p:sp>
             <p:nvSpPr>
               <p:cNvPr id="201" name="TextBox 200"/>
@@ -7208,7 +7208,7 @@
             <p:spPr>
               <a:xfrm>
                 <a:off x="2088963" y="3173694"/>
-                <a:ext cx="328936" cy="254878"/>
+                <a:ext cx="328936" cy="233590"/>
               </a:xfrm>
               <a:prstGeom prst="rect">
                 <a:avLst/>
@@ -7252,7 +7252,7 @@
                             <a:rPr lang="en-US" altLang="ko-KR" sz="900" b="0" i="1" smtClean="0">
                               <a:latin typeface="Cambria Math"/>
                             </a:rPr>
-                            <m:t>𝑗</m:t>
+                            <m:t>2</m:t>
                           </m:r>
                         </m:sub>
                         <m:sup>
@@ -7272,7 +7272,7 @@
             </p:txBody>
           </p:sp>
         </mc:Choice>
-        <mc:Fallback xmlns="">
+        <mc:Fallback>
           <p:sp>
             <p:nvSpPr>
               <p:cNvPr id="201" name="TextBox 200"/>
@@ -7284,7 +7284,7 @@
             <p:spPr>
               <a:xfrm>
                 <a:off x="2088963" y="3173694"/>
-                <a:ext cx="328936" cy="254878"/>
+                <a:ext cx="328936" cy="233590"/>
               </a:xfrm>
               <a:prstGeom prst="rect">
                 <a:avLst/>
@@ -7425,8 +7425,8 @@
           </p:sp>
         </mc:Fallback>
       </mc:AlternateContent>
-      <mc:AlternateContent xmlns:mc="http://schemas.openxmlformats.org/markup-compatibility/2006">
-        <mc:Choice xmlns:a14="http://schemas.microsoft.com/office/drawing/2010/main" Requires="a14">
+      <mc:AlternateContent xmlns:mc="http://schemas.openxmlformats.org/markup-compatibility/2006" xmlns:a14="http://schemas.microsoft.com/office/drawing/2010/main">
+        <mc:Choice Requires="a14">
           <p:sp>
             <p:nvSpPr>
               <p:cNvPr id="204" name="TextBox 203"/>
@@ -7500,7 +7500,7 @@
             </p:txBody>
           </p:sp>
         </mc:Choice>
-        <mc:Fallback>
+        <mc:Fallback xmlns="">
           <p:sp>
             <p:nvSpPr>
               <p:cNvPr id="204" name="TextBox 203"/>
@@ -7539,8 +7539,8 @@
           </p:sp>
         </mc:Fallback>
       </mc:AlternateContent>
-      <mc:AlternateContent xmlns:mc="http://schemas.openxmlformats.org/markup-compatibility/2006">
-        <mc:Choice xmlns:a14="http://schemas.microsoft.com/office/drawing/2010/main" Requires="a14">
+      <mc:AlternateContent xmlns:mc="http://schemas.openxmlformats.org/markup-compatibility/2006" xmlns:a14="http://schemas.microsoft.com/office/drawing/2010/main">
+        <mc:Choice Requires="a14">
           <p:sp>
             <p:nvSpPr>
               <p:cNvPr id="205" name="TextBox 204"/>
@@ -7620,7 +7620,7 @@
             </p:txBody>
           </p:sp>
         </mc:Choice>
-        <mc:Fallback>
+        <mc:Fallback xmlns="">
           <p:sp>
             <p:nvSpPr>
               <p:cNvPr id="205" name="TextBox 204"/>
@@ -7659,8 +7659,8 @@
           </p:sp>
         </mc:Fallback>
       </mc:AlternateContent>
-      <mc:AlternateContent xmlns:mc="http://schemas.openxmlformats.org/markup-compatibility/2006">
-        <mc:Choice xmlns:a14="http://schemas.microsoft.com/office/drawing/2010/main" Requires="a14">
+      <mc:AlternateContent xmlns:mc="http://schemas.openxmlformats.org/markup-compatibility/2006" xmlns:a14="http://schemas.microsoft.com/office/drawing/2010/main">
+        <mc:Choice Requires="a14">
           <p:sp>
             <p:nvSpPr>
               <p:cNvPr id="206" name="TextBox 205"/>
@@ -7734,7 +7734,7 @@
             </p:txBody>
           </p:sp>
         </mc:Choice>
-        <mc:Fallback>
+        <mc:Fallback xmlns="">
           <p:sp>
             <p:nvSpPr>
               <p:cNvPr id="206" name="TextBox 205"/>
@@ -9033,8 +9033,8 @@
           </p:sp>
         </mc:Fallback>
       </mc:AlternateContent>
-      <mc:AlternateContent xmlns:mc="http://schemas.openxmlformats.org/markup-compatibility/2006" xmlns:a14="http://schemas.microsoft.com/office/drawing/2010/main">
-        <mc:Choice Requires="a14">
+      <mc:AlternateContent xmlns:mc="http://schemas.openxmlformats.org/markup-compatibility/2006">
+        <mc:Choice xmlns:a14="http://schemas.microsoft.com/office/drawing/2010/main" Requires="a14">
           <p:sp>
             <p:nvSpPr>
               <p:cNvPr id="219" name="TextBox 218"/>
@@ -9044,7 +9044,7 @@
             <p:spPr>
               <a:xfrm>
                 <a:off x="4906840" y="3146902"/>
-                <a:ext cx="330988" cy="236347"/>
+                <a:ext cx="330988" cy="232756"/>
               </a:xfrm>
               <a:prstGeom prst="rect">
                 <a:avLst/>
@@ -9088,7 +9088,7 @@
                             <a:rPr lang="en-US" altLang="ko-KR" sz="900" b="0" i="1" smtClean="0">
                               <a:latin typeface="Cambria Math"/>
                             </a:rPr>
-                            <m:t>𝑙</m:t>
+                            <m:t>2</m:t>
                           </m:r>
                         </m:sub>
                         <m:sup>
@@ -9108,7 +9108,7 @@
             </p:txBody>
           </p:sp>
         </mc:Choice>
-        <mc:Fallback xmlns="">
+        <mc:Fallback>
           <p:sp>
             <p:nvSpPr>
               <p:cNvPr id="219" name="TextBox 218"/>
@@ -9120,7 +9120,7 @@
             <p:spPr>
               <a:xfrm>
                 <a:off x="4906840" y="3146902"/>
-                <a:ext cx="330988" cy="236347"/>
+                <a:ext cx="330988" cy="232756"/>
               </a:xfrm>
               <a:prstGeom prst="rect">
                 <a:avLst/>
@@ -9261,8 +9261,8 @@
           </p:sp>
         </mc:Fallback>
       </mc:AlternateContent>
-      <mc:AlternateContent xmlns:mc="http://schemas.openxmlformats.org/markup-compatibility/2006">
-        <mc:Choice xmlns:a14="http://schemas.microsoft.com/office/drawing/2010/main" Requires="a14">
+      <mc:AlternateContent xmlns:mc="http://schemas.openxmlformats.org/markup-compatibility/2006" xmlns:a14="http://schemas.microsoft.com/office/drawing/2010/main">
+        <mc:Choice Requires="a14">
           <p:sp>
             <p:nvSpPr>
               <p:cNvPr id="221" name="직사각형 220"/>
@@ -9399,7 +9399,7 @@
             </p:txBody>
           </p:sp>
         </mc:Choice>
-        <mc:Fallback>
+        <mc:Fallback xmlns="">
           <p:sp>
             <p:nvSpPr>
               <p:cNvPr id="221" name="직사각형 220"/>
@@ -9663,8 +9663,8 @@
           </p:sp>
         </mc:Fallback>
       </mc:AlternateContent>
-      <mc:AlternateContent xmlns:mc="http://schemas.openxmlformats.org/markup-compatibility/2006">
-        <mc:Choice xmlns:a14="http://schemas.microsoft.com/office/drawing/2010/main" Requires="a14">
+      <mc:AlternateContent xmlns:mc="http://schemas.openxmlformats.org/markup-compatibility/2006" xmlns:a14="http://schemas.microsoft.com/office/drawing/2010/main">
+        <mc:Choice Requires="a14">
           <p:sp>
             <p:nvSpPr>
               <p:cNvPr id="223" name="TextBox 222"/>
@@ -9780,7 +9780,7 @@
             </p:txBody>
           </p:sp>
         </mc:Choice>
-        <mc:Fallback>
+        <mc:Fallback xmlns="">
           <p:sp>
             <p:nvSpPr>
               <p:cNvPr id="223" name="TextBox 222"/>
@@ -9928,8 +9928,8 @@
           </p:sp>
         </mc:Fallback>
       </mc:AlternateContent>
-      <mc:AlternateContent xmlns:mc="http://schemas.openxmlformats.org/markup-compatibility/2006" xmlns:a14="http://schemas.microsoft.com/office/drawing/2010/main">
-        <mc:Choice Requires="a14">
+      <mc:AlternateContent xmlns:mc="http://schemas.openxmlformats.org/markup-compatibility/2006">
+        <mc:Choice xmlns:a14="http://schemas.microsoft.com/office/drawing/2010/main" Requires="a14">
           <p:sp>
             <p:nvSpPr>
               <p:cNvPr id="225" name="직사각형 224"/>
@@ -9938,7 +9938,7 @@
             </p:nvSpPr>
             <p:spPr>
               <a:xfrm>
-                <a:off x="4084759" y="4365104"/>
+                <a:off x="4154609" y="3519857"/>
                 <a:ext cx="1254948" cy="497444"/>
               </a:xfrm>
               <a:prstGeom prst="rect">
@@ -10121,7 +10121,7 @@
             </p:txBody>
           </p:sp>
         </mc:Choice>
-        <mc:Fallback xmlns="">
+        <mc:Fallback>
           <p:sp>
             <p:nvSpPr>
               <p:cNvPr id="225" name="직사각형 224"/>
@@ -10132,7 +10132,7 @@
             </p:nvSpPr>
             <p:spPr>
               <a:xfrm>
-                <a:off x="4084759" y="4365104"/>
+                <a:off x="4154609" y="3519857"/>
                 <a:ext cx="1254948" cy="497444"/>
               </a:xfrm>
               <a:prstGeom prst="rect">
@@ -10141,7 +10141,7 @@
               <a:blipFill rotWithShape="1">
                 <a:blip r:embed="rId32"/>
                 <a:stretch>
-                  <a:fillRect l="-19903" t="-85366" b="-131707"/>
+                  <a:fillRect l="-20488" t="-85366" b="-131707"/>
                 </a:stretch>
               </a:blipFill>
             </p:spPr>
@@ -11595,8 +11595,8 @@
           </a:p>
         </p:txBody>
       </p:sp>
-      <mc:AlternateContent xmlns:mc="http://schemas.openxmlformats.org/markup-compatibility/2006" xmlns:a14="http://schemas.microsoft.com/office/drawing/2010/main">
-        <mc:Choice Requires="a14">
+      <mc:AlternateContent xmlns:mc="http://schemas.openxmlformats.org/markup-compatibility/2006">
+        <mc:Choice xmlns:a14="http://schemas.microsoft.com/office/drawing/2010/main" Requires="a14">
           <p:sp>
             <p:nvSpPr>
               <p:cNvPr id="246" name="TextBox 245"/>
@@ -11605,7 +11605,7 @@
             </p:nvSpPr>
             <p:spPr>
               <a:xfrm>
-                <a:off x="2621505" y="3176158"/>
+                <a:off x="2491808" y="3618018"/>
                 <a:ext cx="456663" cy="233269"/>
               </a:xfrm>
               <a:prstGeom prst="rect">
@@ -11670,7 +11670,7 @@
             </p:txBody>
           </p:sp>
         </mc:Choice>
-        <mc:Fallback xmlns="">
+        <mc:Fallback>
           <p:sp>
             <p:nvSpPr>
               <p:cNvPr id="246" name="TextBox 245"/>
@@ -11681,7 +11681,7 @@
             </p:nvSpPr>
             <p:spPr>
               <a:xfrm>
-                <a:off x="2621505" y="3176158"/>
+                <a:off x="2491808" y="3618018"/>
                 <a:ext cx="456663" cy="233269"/>
               </a:xfrm>
               <a:prstGeom prst="rect">
@@ -12513,8 +12513,8 @@
           </p:sp>
         </mc:Fallback>
       </mc:AlternateContent>
-      <mc:AlternateContent xmlns:mc="http://schemas.openxmlformats.org/markup-compatibility/2006" xmlns:a14="http://schemas.microsoft.com/office/drawing/2010/main">
-        <mc:Choice Requires="a14">
+      <mc:AlternateContent xmlns:mc="http://schemas.openxmlformats.org/markup-compatibility/2006">
+        <mc:Choice xmlns:a14="http://schemas.microsoft.com/office/drawing/2010/main" Requires="a14">
           <p:sp>
             <p:nvSpPr>
               <p:cNvPr id="254" name="TextBox 253"/>
@@ -12524,7 +12524,7 @@
             <p:spPr>
               <a:xfrm>
                 <a:off x="2987824" y="3160290"/>
-                <a:ext cx="332975" cy="236027"/>
+                <a:ext cx="328551" cy="232436"/>
               </a:xfrm>
               <a:prstGeom prst="rect">
                 <a:avLst/>
@@ -12568,7 +12568,7 @@
                             <a:rPr lang="en-US" altLang="ko-KR" sz="900" b="0" i="1" smtClean="0">
                               <a:latin typeface="Cambria Math"/>
                             </a:rPr>
-                            <m:t>𝑘</m:t>
+                            <m:t>2</m:t>
                           </m:r>
                         </m:sub>
                         <m:sup>
@@ -12588,7 +12588,7 @@
             </p:txBody>
           </p:sp>
         </mc:Choice>
-        <mc:Fallback xmlns="">
+        <mc:Fallback>
           <p:sp>
             <p:nvSpPr>
               <p:cNvPr id="254" name="TextBox 253"/>
@@ -12600,7 +12600,7 @@
             <p:spPr>
               <a:xfrm>
                 <a:off x="2987824" y="3160290"/>
-                <a:ext cx="332975" cy="236027"/>
+                <a:ext cx="328551" cy="232436"/>
               </a:xfrm>
               <a:prstGeom prst="rect">
                 <a:avLst/>

</xml_diff>